<commit_message>
Slimmed the PageRankStep dataflow graph down
</commit_message>
<xml_diff>
--- a/paper/images/pageRankStep.pptx
+++ b/paper/images/pageRankStep.pptx
@@ -104,6 +104,22 @@
       </a:defRPr>
     </a:lvl9pPr>
   </p:defaultTextStyle>
+  <p:extLst>
+    <p:ext uri="{EFAFB233-063F-42B5-8137-9DF3F51BA10A}">
+      <p15:sldGuideLst xmlns:p15="http://schemas.microsoft.com/office/powerpoint/2012/main">
+        <p15:guide id="1" orient="horz" pos="2160">
+          <p15:clr>
+            <a:srgbClr val="A4A3A4"/>
+          </p15:clr>
+        </p15:guide>
+        <p15:guide id="2" pos="2880">
+          <p15:clr>
+            <a:srgbClr val="A4A3A4"/>
+          </p15:clr>
+        </p15:guide>
+      </p15:sldGuideLst>
+    </p:ext>
+  </p:extLst>
 </p:presentation>
 </file>
 
@@ -289,7 +305,7 @@
             <a:fld id="{CD66EB5A-4F37-441C-A97C-356D4BF20A1B}" type="datetimeFigureOut">
               <a:rPr lang="de-DE" smtClean="0"/>
               <a:pPr/>
-              <a:t>14/08/14</a:t>
+              <a:t>15.12.16</a:t>
             </a:fld>
             <a:endParaRPr lang="de-DE"/>
           </a:p>
@@ -332,7 +348,7 @@
             <a:fld id="{DF8402F8-FF20-44EF-9D70-5A7001AC350C}" type="slidenum">
               <a:rPr lang="de-DE" smtClean="0"/>
               <a:pPr/>
-              <a:t>‹Nr.›</a:t>
+              <a:t>‹#›</a:t>
             </a:fld>
             <a:endParaRPr lang="de-DE"/>
           </a:p>
@@ -456,7 +472,7 @@
             <a:fld id="{CD66EB5A-4F37-441C-A97C-356D4BF20A1B}" type="datetimeFigureOut">
               <a:rPr lang="de-DE" smtClean="0"/>
               <a:pPr/>
-              <a:t>14/08/14</a:t>
+              <a:t>15.12.16</a:t>
             </a:fld>
             <a:endParaRPr lang="de-DE"/>
           </a:p>
@@ -499,7 +515,7 @@
             <a:fld id="{DF8402F8-FF20-44EF-9D70-5A7001AC350C}" type="slidenum">
               <a:rPr lang="de-DE" smtClean="0"/>
               <a:pPr/>
-              <a:t>‹Nr.›</a:t>
+              <a:t>‹#›</a:t>
             </a:fld>
             <a:endParaRPr lang="de-DE"/>
           </a:p>
@@ -633,7 +649,7 @@
             <a:fld id="{CD66EB5A-4F37-441C-A97C-356D4BF20A1B}" type="datetimeFigureOut">
               <a:rPr lang="de-DE" smtClean="0"/>
               <a:pPr/>
-              <a:t>14/08/14</a:t>
+              <a:t>15.12.16</a:t>
             </a:fld>
             <a:endParaRPr lang="de-DE"/>
           </a:p>
@@ -676,7 +692,7 @@
             <a:fld id="{DF8402F8-FF20-44EF-9D70-5A7001AC350C}" type="slidenum">
               <a:rPr lang="de-DE" smtClean="0"/>
               <a:pPr/>
-              <a:t>‹Nr.›</a:t>
+              <a:t>‹#›</a:t>
             </a:fld>
             <a:endParaRPr lang="de-DE"/>
           </a:p>
@@ -800,7 +816,7 @@
             <a:fld id="{CD66EB5A-4F37-441C-A97C-356D4BF20A1B}" type="datetimeFigureOut">
               <a:rPr lang="de-DE" smtClean="0"/>
               <a:pPr/>
-              <a:t>14/08/14</a:t>
+              <a:t>15.12.16</a:t>
             </a:fld>
             <a:endParaRPr lang="de-DE"/>
           </a:p>
@@ -843,7 +859,7 @@
             <a:fld id="{DF8402F8-FF20-44EF-9D70-5A7001AC350C}" type="slidenum">
               <a:rPr lang="de-DE" smtClean="0"/>
               <a:pPr/>
-              <a:t>‹Nr.›</a:t>
+              <a:t>‹#›</a:t>
             </a:fld>
             <a:endParaRPr lang="de-DE"/>
           </a:p>
@@ -1043,7 +1059,7 @@
             <a:fld id="{CD66EB5A-4F37-441C-A97C-356D4BF20A1B}" type="datetimeFigureOut">
               <a:rPr lang="de-DE" smtClean="0"/>
               <a:pPr/>
-              <a:t>14/08/14</a:t>
+              <a:t>15.12.16</a:t>
             </a:fld>
             <a:endParaRPr lang="de-DE"/>
           </a:p>
@@ -1086,7 +1102,7 @@
             <a:fld id="{DF8402F8-FF20-44EF-9D70-5A7001AC350C}" type="slidenum">
               <a:rPr lang="de-DE" smtClean="0"/>
               <a:pPr/>
-              <a:t>‹Nr.›</a:t>
+              <a:t>‹#›</a:t>
             </a:fld>
             <a:endParaRPr lang="de-DE"/>
           </a:p>
@@ -1328,7 +1344,7 @@
             <a:fld id="{CD66EB5A-4F37-441C-A97C-356D4BF20A1B}" type="datetimeFigureOut">
               <a:rPr lang="de-DE" smtClean="0"/>
               <a:pPr/>
-              <a:t>14/08/14</a:t>
+              <a:t>15.12.16</a:t>
             </a:fld>
             <a:endParaRPr lang="de-DE"/>
           </a:p>
@@ -1371,7 +1387,7 @@
             <a:fld id="{DF8402F8-FF20-44EF-9D70-5A7001AC350C}" type="slidenum">
               <a:rPr lang="de-DE" smtClean="0"/>
               <a:pPr/>
-              <a:t>‹Nr.›</a:t>
+              <a:t>‹#›</a:t>
             </a:fld>
             <a:endParaRPr lang="de-DE"/>
           </a:p>
@@ -1747,7 +1763,7 @@
             <a:fld id="{CD66EB5A-4F37-441C-A97C-356D4BF20A1B}" type="datetimeFigureOut">
               <a:rPr lang="de-DE" smtClean="0"/>
               <a:pPr/>
-              <a:t>14/08/14</a:t>
+              <a:t>15.12.16</a:t>
             </a:fld>
             <a:endParaRPr lang="de-DE"/>
           </a:p>
@@ -1790,7 +1806,7 @@
             <a:fld id="{DF8402F8-FF20-44EF-9D70-5A7001AC350C}" type="slidenum">
               <a:rPr lang="de-DE" smtClean="0"/>
               <a:pPr/>
-              <a:t>‹Nr.›</a:t>
+              <a:t>‹#›</a:t>
             </a:fld>
             <a:endParaRPr lang="de-DE"/>
           </a:p>
@@ -1862,7 +1878,7 @@
             <a:fld id="{CD66EB5A-4F37-441C-A97C-356D4BF20A1B}" type="datetimeFigureOut">
               <a:rPr lang="de-DE" smtClean="0"/>
               <a:pPr/>
-              <a:t>14/08/14</a:t>
+              <a:t>15.12.16</a:t>
             </a:fld>
             <a:endParaRPr lang="de-DE"/>
           </a:p>
@@ -1905,7 +1921,7 @@
             <a:fld id="{DF8402F8-FF20-44EF-9D70-5A7001AC350C}" type="slidenum">
               <a:rPr lang="de-DE" smtClean="0"/>
               <a:pPr/>
-              <a:t>‹Nr.›</a:t>
+              <a:t>‹#›</a:t>
             </a:fld>
             <a:endParaRPr lang="de-DE"/>
           </a:p>
@@ -1954,7 +1970,7 @@
             <a:fld id="{CD66EB5A-4F37-441C-A97C-356D4BF20A1B}" type="datetimeFigureOut">
               <a:rPr lang="de-DE" smtClean="0"/>
               <a:pPr/>
-              <a:t>14/08/14</a:t>
+              <a:t>15.12.16</a:t>
             </a:fld>
             <a:endParaRPr lang="de-DE"/>
           </a:p>
@@ -1997,7 +2013,7 @@
             <a:fld id="{DF8402F8-FF20-44EF-9D70-5A7001AC350C}" type="slidenum">
               <a:rPr lang="de-DE" smtClean="0"/>
               <a:pPr/>
-              <a:t>‹Nr.›</a:t>
+              <a:t>‹#›</a:t>
             </a:fld>
             <a:endParaRPr lang="de-DE"/>
           </a:p>
@@ -2228,7 +2244,7 @@
             <a:fld id="{CD66EB5A-4F37-441C-A97C-356D4BF20A1B}" type="datetimeFigureOut">
               <a:rPr lang="de-DE" smtClean="0"/>
               <a:pPr/>
-              <a:t>14/08/14</a:t>
+              <a:t>15.12.16</a:t>
             </a:fld>
             <a:endParaRPr lang="de-DE"/>
           </a:p>
@@ -2271,7 +2287,7 @@
             <a:fld id="{DF8402F8-FF20-44EF-9D70-5A7001AC350C}" type="slidenum">
               <a:rPr lang="de-DE" smtClean="0"/>
               <a:pPr/>
-              <a:t>‹Nr.›</a:t>
+              <a:t>‹#›</a:t>
             </a:fld>
             <a:endParaRPr lang="de-DE"/>
           </a:p>
@@ -2478,7 +2494,7 @@
             <a:fld id="{CD66EB5A-4F37-441C-A97C-356D4BF20A1B}" type="datetimeFigureOut">
               <a:rPr lang="de-DE" smtClean="0"/>
               <a:pPr/>
-              <a:t>14/08/14</a:t>
+              <a:t>15.12.16</a:t>
             </a:fld>
             <a:endParaRPr lang="de-DE"/>
           </a:p>
@@ -2521,7 +2537,7 @@
             <a:fld id="{DF8402F8-FF20-44EF-9D70-5A7001AC350C}" type="slidenum">
               <a:rPr lang="de-DE" smtClean="0"/>
               <a:pPr/>
-              <a:t>‹Nr.›</a:t>
+              <a:t>‹#›</a:t>
             </a:fld>
             <a:endParaRPr lang="de-DE"/>
           </a:p>
@@ -2688,7 +2704,7 @@
             <a:fld id="{CD66EB5A-4F37-441C-A97C-356D4BF20A1B}" type="datetimeFigureOut">
               <a:rPr lang="de-DE" smtClean="0"/>
               <a:pPr/>
-              <a:t>14/08/14</a:t>
+              <a:t>15.12.16</a:t>
             </a:fld>
             <a:endParaRPr lang="de-DE"/>
           </a:p>
@@ -2767,7 +2783,7 @@
             <a:fld id="{DF8402F8-FF20-44EF-9D70-5A7001AC350C}" type="slidenum">
               <a:rPr lang="de-DE" smtClean="0"/>
               <a:pPr/>
-              <a:t>‹Nr.›</a:t>
+              <a:t>‹#›</a:t>
             </a:fld>
             <a:endParaRPr lang="de-DE"/>
           </a:p>
@@ -3067,8 +3083,8 @@
         </p:nvSpPr>
         <p:spPr>
           <a:xfrm>
-            <a:off x="2339752" y="4869160"/>
-            <a:ext cx="1440160" cy="1152128"/>
+            <a:off x="112414" y="1745567"/>
+            <a:ext cx="1116000" cy="1116000"/>
           </a:xfrm>
           <a:prstGeom prst="ellipse">
             <a:avLst/>
@@ -3111,51 +3127,9 @@
               </a:rPr>
               <a:t>rank</a:t>
             </a:r>
-            <a:endParaRPr lang="de-DE" sz="2200" b="1" dirty="0" smtClean="0">
-              <a:solidFill>
-                <a:schemeClr val="tx1"/>
-              </a:solidFill>
-            </a:endParaRPr>
-          </a:p>
-        </p:txBody>
-      </p:sp>
-      <p:cxnSp>
-        <p:nvCxnSpPr>
-          <p:cNvPr id="31" name="Straight Arrow Connector 14"/>
-          <p:cNvCxnSpPr/>
-          <p:nvPr/>
-        </p:nvCxnSpPr>
-        <p:spPr>
-          <a:xfrm flipV="1">
-            <a:off x="3059832" y="4581128"/>
-            <a:ext cx="8929" cy="273212"/>
-          </a:xfrm>
-          <a:prstGeom prst="straightConnector1">
-            <a:avLst/>
-          </a:prstGeom>
-          <a:ln w="25400">
-            <a:solidFill>
-              <a:schemeClr val="tx1"/>
-            </a:solidFill>
-            <a:prstDash val="solid"/>
-            <a:tailEnd type="triangle" w="lg" len="lg"/>
-          </a:ln>
-        </p:spPr>
-        <p:style>
-          <a:lnRef idx="1">
-            <a:schemeClr val="accent1"/>
-          </a:lnRef>
-          <a:fillRef idx="0">
-            <a:schemeClr val="accent1"/>
-          </a:fillRef>
-          <a:effectRef idx="0">
-            <a:schemeClr val="accent1"/>
-          </a:effectRef>
-          <a:fontRef idx="minor">
-            <a:schemeClr val="tx1"/>
-          </a:fontRef>
-        </p:style>
-      </p:cxnSp>
+          </a:p>
+        </p:txBody>
+      </p:sp>
       <p:graphicFrame>
         <p:nvGraphicFramePr>
           <p:cNvPr id="32" name="Objekt 31"/>
@@ -3165,20 +3139,20 @@
           <p:nvPr>
             <p:extLst>
               <p:ext uri="{D42A27DB-BD31-4B8C-83A1-F6EECF244321}">
-                <p14:modId xmlns:p14="http://schemas.microsoft.com/office/powerpoint/2010/main" val="1682554092"/>
+                <p14:modId xmlns:p14="http://schemas.microsoft.com/office/powerpoint/2010/main" val="530049638"/>
               </p:ext>
             </p:extLst>
           </p:nvPr>
         </p:nvGraphicFramePr>
         <p:xfrm>
-          <a:off x="2752725" y="6092825"/>
+          <a:off x="325945" y="2933576"/>
           <a:ext cx="584200" cy="279400"/>
         </p:xfrm>
         <a:graphic>
           <a:graphicData uri="http://schemas.openxmlformats.org/presentationml/2006/ole">
             <mc:AlternateContent xmlns:mc="http://schemas.openxmlformats.org/markup-compatibility/2006">
               <mc:Choice xmlns:v="urn:schemas-microsoft-com:vml" Requires="v">
-                <p:oleObj spid="_x0000_s1193" name="Equation" r:id="rId3" imgW="584200" imgH="279400" progId="Equation.3">
+                <p:oleObj spid="_x0000_s1217" name="Equation" r:id="rId3" imgW="584200" imgH="279400" progId="Equation.3">
                   <p:embed/>
                 </p:oleObj>
               </mc:Choice>
@@ -3199,7 +3173,7 @@
                     </p:blipFill>
                     <p:spPr>
                       <a:xfrm>
-                        <a:off x="2752725" y="6092825"/>
+                        <a:off x="325945" y="2933576"/>
                         <a:ext cx="584200" cy="279400"/>
                       </a:xfrm>
                       <a:prstGeom prst="rect">
@@ -3221,8 +3195,8 @@
         </p:nvSpPr>
         <p:spPr>
           <a:xfrm>
-            <a:off x="4788024" y="4869160"/>
-            <a:ext cx="1440160" cy="1152128"/>
+            <a:off x="112414" y="3356992"/>
+            <a:ext cx="1116000" cy="1115343"/>
           </a:xfrm>
           <a:prstGeom prst="ellipse">
             <a:avLst/>
@@ -3271,7 +3245,31 @@
                   <a:schemeClr val="tx1"/>
                 </a:solidFill>
               </a:rPr>
-              <a:t>djacency</a:t>
+              <a:t>dj.</a:t>
+            </a:r>
+            <a:r>
+              <a:rPr lang="de-DE" sz="2200" b="1" dirty="0" smtClean="0">
+                <a:solidFill>
+                  <a:schemeClr val="tx1"/>
+                </a:solidFill>
+              </a:rPr>
+              <a:t> </a:t>
+            </a:r>
+            <a:r>
+              <a:rPr lang="de-DE" sz="2200" b="1" dirty="0" err="1" smtClean="0">
+                <a:solidFill>
+                  <a:schemeClr val="tx1"/>
+                </a:solidFill>
+              </a:rPr>
+              <a:t>l</a:t>
+            </a:r>
+            <a:r>
+              <a:rPr lang="de-DE" sz="2200" b="1" dirty="0" err="1" smtClean="0">
+                <a:solidFill>
+                  <a:schemeClr val="tx1"/>
+                </a:solidFill>
+              </a:rPr>
+              <a:t>ist</a:t>
             </a:r>
             <a:endParaRPr lang="de-DE" sz="2200" b="1" dirty="0" smtClean="0">
               <a:solidFill>
@@ -3279,61 +3277,8 @@
               </a:solidFill>
             </a:endParaRPr>
           </a:p>
-          <a:p>
-            <a:pPr algn="ctr"/>
-            <a:r>
-              <a:rPr lang="de-DE" sz="2200" b="1" dirty="0" err="1" smtClean="0">
-                <a:solidFill>
-                  <a:schemeClr val="tx1"/>
-                </a:solidFill>
-              </a:rPr>
-              <a:t>list</a:t>
-            </a:r>
-            <a:endParaRPr lang="de-DE" sz="2200" b="1" dirty="0" smtClean="0">
-              <a:solidFill>
-                <a:schemeClr val="tx1"/>
-              </a:solidFill>
-            </a:endParaRPr>
-          </a:p>
-        </p:txBody>
-      </p:sp>
-      <p:cxnSp>
-        <p:nvCxnSpPr>
-          <p:cNvPr id="40" name="Straight Arrow Connector 14"/>
-          <p:cNvCxnSpPr/>
-          <p:nvPr/>
-        </p:nvCxnSpPr>
-        <p:spPr>
-          <a:xfrm flipV="1">
-            <a:off x="5508104" y="4581128"/>
-            <a:ext cx="8929" cy="273212"/>
-          </a:xfrm>
-          <a:prstGeom prst="straightConnector1">
-            <a:avLst/>
-          </a:prstGeom>
-          <a:ln w="25400">
-            <a:solidFill>
-              <a:schemeClr val="tx1"/>
-            </a:solidFill>
-            <a:prstDash val="solid"/>
-            <a:tailEnd type="triangle" w="lg" len="lg"/>
-          </a:ln>
-        </p:spPr>
-        <p:style>
-          <a:lnRef idx="1">
-            <a:schemeClr val="accent1"/>
-          </a:lnRef>
-          <a:fillRef idx="0">
-            <a:schemeClr val="accent1"/>
-          </a:fillRef>
-          <a:effectRef idx="0">
-            <a:schemeClr val="accent1"/>
-          </a:effectRef>
-          <a:fontRef idx="minor">
-            <a:schemeClr val="tx1"/>
-          </a:fontRef>
-        </p:style>
-      </p:cxnSp>
+        </p:txBody>
+      </p:sp>
       <p:graphicFrame>
         <p:nvGraphicFramePr>
           <p:cNvPr id="41" name="Objekt 40"/>
@@ -3343,20 +3288,20 @@
           <p:nvPr>
             <p:extLst>
               <p:ext uri="{D42A27DB-BD31-4B8C-83A1-F6EECF244321}">
-                <p14:modId xmlns:p14="http://schemas.microsoft.com/office/powerpoint/2010/main" val="1125201843"/>
+                <p14:modId xmlns:p14="http://schemas.microsoft.com/office/powerpoint/2010/main" val="782098110"/>
               </p:ext>
             </p:extLst>
           </p:nvPr>
         </p:nvGraphicFramePr>
         <p:xfrm>
-          <a:off x="5220072" y="6093296"/>
+          <a:off x="331583" y="4550614"/>
           <a:ext cx="609600" cy="279400"/>
         </p:xfrm>
         <a:graphic>
           <a:graphicData uri="http://schemas.openxmlformats.org/presentationml/2006/ole">
             <mc:AlternateContent xmlns:mc="http://schemas.openxmlformats.org/markup-compatibility/2006">
               <mc:Choice xmlns:v="urn:schemas-microsoft-com:vml" Requires="v">
-                <p:oleObj spid="_x0000_s1194" name="Equation" r:id="rId5" imgW="609600" imgH="279400" progId="Equation.3">
+                <p:oleObj spid="_x0000_s1218" name="Equation" r:id="rId5" imgW="609600" imgH="279400" progId="Equation.3">
                   <p:embed/>
                 </p:oleObj>
               </mc:Choice>
@@ -3377,7 +3322,7 @@
                     </p:blipFill>
                     <p:spPr>
                       <a:xfrm>
-                        <a:off x="5220072" y="6093296"/>
+                        <a:off x="331583" y="4550614"/>
                         <a:ext cx="609600" cy="279400"/>
                       </a:xfrm>
                       <a:prstGeom prst="rect">
@@ -3391,43 +3336,6 @@
           </a:graphicData>
         </a:graphic>
       </p:graphicFrame>
-      <p:cxnSp>
-        <p:nvCxnSpPr>
-          <p:cNvPr id="42" name="Straight Arrow Connector 14"/>
-          <p:cNvCxnSpPr/>
-          <p:nvPr/>
-        </p:nvCxnSpPr>
-        <p:spPr>
-          <a:xfrm flipV="1">
-            <a:off x="4283968" y="3501008"/>
-            <a:ext cx="8929" cy="273212"/>
-          </a:xfrm>
-          <a:prstGeom prst="straightConnector1">
-            <a:avLst/>
-          </a:prstGeom>
-          <a:ln w="25400">
-            <a:solidFill>
-              <a:schemeClr val="tx1"/>
-            </a:solidFill>
-            <a:prstDash val="solid"/>
-            <a:tailEnd type="triangle" w="lg" len="lg"/>
-          </a:ln>
-        </p:spPr>
-        <p:style>
-          <a:lnRef idx="1">
-            <a:schemeClr val="accent1"/>
-          </a:lnRef>
-          <a:fillRef idx="0">
-            <a:schemeClr val="accent1"/>
-          </a:fillRef>
-          <a:effectRef idx="0">
-            <a:schemeClr val="accent1"/>
-          </a:effectRef>
-          <a:fontRef idx="minor">
-            <a:schemeClr val="tx1"/>
-          </a:fontRef>
-        </p:style>
-      </p:cxnSp>
       <p:sp>
         <p:nvSpPr>
           <p:cNvPr id="43" name="Rounded Rectangle 8"/>
@@ -3436,8 +3344,8 @@
         </p:nvSpPr>
         <p:spPr>
           <a:xfrm>
-            <a:off x="2339752" y="2708920"/>
-            <a:ext cx="3888432" cy="785818"/>
+            <a:off x="3708872" y="2129719"/>
+            <a:ext cx="1901243" cy="2088232"/>
           </a:xfrm>
           <a:prstGeom prst="roundRect">
             <a:avLst/>
@@ -3468,7 +3376,7 @@
           </a:fontRef>
         </p:style>
         <p:txBody>
-          <a:bodyPr wrap="none" rtlCol="0" anchor="ctr"/>
+          <a:bodyPr wrap="none" rtlCol="0" anchor="t"/>
           <a:lstStyle/>
           <a:p>
             <a:pPr algn="ctr"/>
@@ -3496,43 +3404,6 @@
           </a:p>
         </p:txBody>
       </p:sp>
-      <p:cxnSp>
-        <p:nvCxnSpPr>
-          <p:cNvPr id="44" name="Straight Arrow Connector 14"/>
-          <p:cNvCxnSpPr/>
-          <p:nvPr/>
-        </p:nvCxnSpPr>
-        <p:spPr>
-          <a:xfrm flipV="1">
-            <a:off x="4283968" y="2420888"/>
-            <a:ext cx="8929" cy="273212"/>
-          </a:xfrm>
-          <a:prstGeom prst="straightConnector1">
-            <a:avLst/>
-          </a:prstGeom>
-          <a:ln w="25400">
-            <a:solidFill>
-              <a:schemeClr val="tx1"/>
-            </a:solidFill>
-            <a:prstDash val="solid"/>
-            <a:tailEnd type="triangle" w="lg" len="lg"/>
-          </a:ln>
-        </p:spPr>
-        <p:style>
-          <a:lnRef idx="1">
-            <a:schemeClr val="accent1"/>
-          </a:lnRef>
-          <a:fillRef idx="0">
-            <a:schemeClr val="accent1"/>
-          </a:fillRef>
-          <a:effectRef idx="0">
-            <a:schemeClr val="accent1"/>
-          </a:effectRef>
-          <a:fontRef idx="minor">
-            <a:schemeClr val="tx1"/>
-          </a:fontRef>
-        </p:style>
-      </p:cxnSp>
       <p:sp>
         <p:nvSpPr>
           <p:cNvPr id="45" name="Rounded Rectangle 8"/>
@@ -3541,8 +3412,8 @@
         </p:nvSpPr>
         <p:spPr>
           <a:xfrm>
-            <a:off x="2339752" y="1628800"/>
-            <a:ext cx="3888432" cy="785818"/>
+            <a:off x="6088689" y="2650372"/>
+            <a:ext cx="1521325" cy="1046929"/>
           </a:xfrm>
           <a:prstGeom prst="roundRect">
             <a:avLst/>
@@ -3609,8 +3480,8 @@
         </p:nvSpPr>
         <p:spPr>
           <a:xfrm>
-            <a:off x="2339752" y="260648"/>
-            <a:ext cx="3888432" cy="1080120"/>
+            <a:off x="8076183" y="2650371"/>
+            <a:ext cx="1675784" cy="1046929"/>
           </a:xfrm>
           <a:prstGeom prst="roundRect">
             <a:avLst/>
@@ -3669,71 +3540,34 @@
           </a:p>
         </p:txBody>
       </p:sp>
-      <p:cxnSp>
-        <p:nvCxnSpPr>
-          <p:cNvPr id="47" name="Straight Arrow Connector 14"/>
-          <p:cNvCxnSpPr/>
-          <p:nvPr/>
-        </p:nvCxnSpPr>
-        <p:spPr>
-          <a:xfrm flipV="1">
-            <a:off x="4283968" y="1340768"/>
-            <a:ext cx="8929" cy="273212"/>
-          </a:xfrm>
-          <a:prstGeom prst="straightConnector1">
-            <a:avLst/>
-          </a:prstGeom>
-          <a:ln w="25400">
-            <a:solidFill>
-              <a:schemeClr val="tx1"/>
-            </a:solidFill>
-            <a:prstDash val="solid"/>
-            <a:tailEnd type="triangle" w="lg" len="lg"/>
-          </a:ln>
-        </p:spPr>
-        <p:style>
-          <a:lnRef idx="1">
-            <a:schemeClr val="accent1"/>
-          </a:lnRef>
-          <a:fillRef idx="0">
-            <a:schemeClr val="accent1"/>
-          </a:fillRef>
-          <a:effectRef idx="0">
-            <a:schemeClr val="accent1"/>
-          </a:effectRef>
-          <a:fontRef idx="minor">
-            <a:schemeClr val="tx1"/>
-          </a:fontRef>
-        </p:style>
-      </p:cxnSp>
       <p:graphicFrame>
         <p:nvGraphicFramePr>
-          <p:cNvPr id="48" name="Objekt 47"/>
+          <p:cNvPr id="49" name="Objekt 48"/>
           <p:cNvGraphicFramePr>
             <a:graphicFrameLocks noChangeAspect="1"/>
           </p:cNvGraphicFramePr>
           <p:nvPr>
             <p:extLst>
               <p:ext uri="{D42A27DB-BD31-4B8C-83A1-F6EECF244321}">
-                <p14:modId xmlns:p14="http://schemas.microsoft.com/office/powerpoint/2010/main" val="4254651590"/>
+                <p14:modId xmlns:p14="http://schemas.microsoft.com/office/powerpoint/2010/main" val="2123015130"/>
               </p:ext>
             </p:extLst>
           </p:nvPr>
         </p:nvGraphicFramePr>
         <p:xfrm>
-          <a:off x="2462213" y="3068638"/>
-          <a:ext cx="3670300" cy="381000"/>
+          <a:off x="6671551" y="3201323"/>
+          <a:ext cx="355600" cy="330200"/>
         </p:xfrm>
         <a:graphic>
           <a:graphicData uri="http://schemas.openxmlformats.org/presentationml/2006/ole">
             <mc:AlternateContent xmlns:mc="http://schemas.openxmlformats.org/markup-compatibility/2006">
               <mc:Choice xmlns:v="urn:schemas-microsoft-com:vml" Requires="v">
-                <p:oleObj spid="_x0000_s1195" name="Equation" r:id="rId7" imgW="3670300" imgH="381000" progId="Equation.3">
+                <p:oleObj spid="_x0000_s1219" name="Equation" r:id="rId7" imgW="355600" imgH="330200" progId="Equation.3">
                   <p:embed/>
                 </p:oleObj>
               </mc:Choice>
               <mc:Fallback>
-                <p:oleObj name="Equation" r:id="rId7" imgW="3670300" imgH="381000" progId="Equation.3">
+                <p:oleObj name="Equation" r:id="rId7" imgW="355600" imgH="330200" progId="Equation.3">
                   <p:embed/>
                   <p:pic>
                     <p:nvPicPr>
@@ -3749,64 +3583,7 @@
                     </p:blipFill>
                     <p:spPr>
                       <a:xfrm>
-                        <a:off x="2462213" y="3068638"/>
-                        <a:ext cx="3670300" cy="381000"/>
-                      </a:xfrm>
-                      <a:prstGeom prst="rect">
-                        <a:avLst/>
-                      </a:prstGeom>
-                    </p:spPr>
-                  </p:pic>
-                </p:oleObj>
-              </mc:Fallback>
-            </mc:AlternateContent>
-          </a:graphicData>
-        </a:graphic>
-      </p:graphicFrame>
-      <p:graphicFrame>
-        <p:nvGraphicFramePr>
-          <p:cNvPr id="49" name="Objekt 48"/>
-          <p:cNvGraphicFramePr>
-            <a:graphicFrameLocks noChangeAspect="1"/>
-          </p:cNvGraphicFramePr>
-          <p:nvPr>
-            <p:extLst>
-              <p:ext uri="{D42A27DB-BD31-4B8C-83A1-F6EECF244321}">
-                <p14:modId xmlns:p14="http://schemas.microsoft.com/office/powerpoint/2010/main" val="1814914543"/>
-              </p:ext>
-            </p:extLst>
-          </p:nvPr>
-        </p:nvGraphicFramePr>
-        <p:xfrm>
-          <a:off x="4067175" y="2060575"/>
-          <a:ext cx="355600" cy="330200"/>
-        </p:xfrm>
-        <a:graphic>
-          <a:graphicData uri="http://schemas.openxmlformats.org/presentationml/2006/ole">
-            <mc:AlternateContent xmlns:mc="http://schemas.openxmlformats.org/markup-compatibility/2006">
-              <mc:Choice xmlns:v="urn:schemas-microsoft-com:vml" Requires="v">
-                <p:oleObj spid="_x0000_s1196" name="Equation" r:id="rId9" imgW="355600" imgH="330200" progId="Equation.3">
-                  <p:embed/>
-                </p:oleObj>
-              </mc:Choice>
-              <mc:Fallback>
-                <p:oleObj name="Equation" r:id="rId9" imgW="355600" imgH="330200" progId="Equation.3">
-                  <p:embed/>
-                  <p:pic>
-                    <p:nvPicPr>
-                      <p:cNvPr id="0" name=""/>
-                      <p:cNvPicPr/>
-                      <p:nvPr/>
-                    </p:nvPicPr>
-                    <p:blipFill>
-                      <a:blip r:embed="rId10"/>
-                      <a:stretch>
-                        <a:fillRect/>
-                      </a:stretch>
-                    </p:blipFill>
-                    <p:spPr>
-                      <a:xfrm>
-                        <a:off x="4067175" y="2060575"/>
+                        <a:off x="6671551" y="3201323"/>
                         <a:ext cx="355600" cy="330200"/>
                       </a:xfrm>
                       <a:prstGeom prst="rect">
@@ -3829,25 +3606,25 @@
           <p:nvPr>
             <p:extLst>
               <p:ext uri="{D42A27DB-BD31-4B8C-83A1-F6EECF244321}">
-                <p14:modId xmlns:p14="http://schemas.microsoft.com/office/powerpoint/2010/main" val="2414962392"/>
+                <p14:modId xmlns:p14="http://schemas.microsoft.com/office/powerpoint/2010/main" val="1074495005"/>
               </p:ext>
             </p:extLst>
           </p:nvPr>
         </p:nvGraphicFramePr>
         <p:xfrm>
-          <a:off x="3851275" y="620713"/>
+          <a:off x="8501325" y="2992972"/>
           <a:ext cx="825500" cy="685800"/>
         </p:xfrm>
         <a:graphic>
           <a:graphicData uri="http://schemas.openxmlformats.org/presentationml/2006/ole">
             <mc:AlternateContent xmlns:mc="http://schemas.openxmlformats.org/markup-compatibility/2006">
               <mc:Choice xmlns:v="urn:schemas-microsoft-com:vml" Requires="v">
-                <p:oleObj spid="_x0000_s1197" name="Equation" r:id="rId11" imgW="825500" imgH="685800" progId="Equation.3">
+                <p:oleObj spid="_x0000_s1220" name="Equation" r:id="rId9" imgW="825500" imgH="685800" progId="Equation.3">
                   <p:embed/>
                 </p:oleObj>
               </mc:Choice>
               <mc:Fallback>
-                <p:oleObj name="Equation" r:id="rId11" imgW="825500" imgH="685800" progId="Equation.3">
+                <p:oleObj name="Equation" r:id="rId9" imgW="825500" imgH="685800" progId="Equation.3">
                   <p:embed/>
                   <p:pic>
                     <p:nvPicPr>
@@ -3856,14 +3633,14 @@
                       <p:nvPr/>
                     </p:nvPicPr>
                     <p:blipFill>
-                      <a:blip r:embed="rId12"/>
+                      <a:blip r:embed="rId10"/>
                       <a:stretch>
                         <a:fillRect/>
                       </a:stretch>
                     </p:blipFill>
                     <p:spPr>
                       <a:xfrm>
-                        <a:off x="3851275" y="620713"/>
+                        <a:off x="8501325" y="2992972"/>
                         <a:ext cx="825500" cy="685800"/>
                       </a:xfrm>
                       <a:prstGeom prst="rect">
@@ -3885,8 +3662,8 @@
         </p:nvSpPr>
         <p:spPr>
           <a:xfrm>
-            <a:off x="2339752" y="3789040"/>
-            <a:ext cx="3888432" cy="785818"/>
+            <a:off x="1475656" y="2650372"/>
+            <a:ext cx="1744307" cy="1046929"/>
           </a:xfrm>
           <a:prstGeom prst="roundRect">
             <a:avLst/>
@@ -3954,25 +3731,25 @@
           <p:nvPr>
             <p:extLst>
               <p:ext uri="{D42A27DB-BD31-4B8C-83A1-F6EECF244321}">
-                <p14:modId xmlns:p14="http://schemas.microsoft.com/office/powerpoint/2010/main" val="3887846447"/>
+                <p14:modId xmlns:p14="http://schemas.microsoft.com/office/powerpoint/2010/main" val="847561412"/>
               </p:ext>
             </p:extLst>
           </p:nvPr>
         </p:nvGraphicFramePr>
         <p:xfrm>
-          <a:off x="3554413" y="4192588"/>
+          <a:off x="1604859" y="3239423"/>
           <a:ext cx="1485900" cy="292100"/>
         </p:xfrm>
         <a:graphic>
           <a:graphicData uri="http://schemas.openxmlformats.org/presentationml/2006/ole">
             <mc:AlternateContent xmlns:mc="http://schemas.openxmlformats.org/markup-compatibility/2006">
               <mc:Choice xmlns:v="urn:schemas-microsoft-com:vml" Requires="v">
-                <p:oleObj spid="_x0000_s1198" name="Equation" r:id="rId13" imgW="1485900" imgH="292100" progId="Equation.3">
+                <p:oleObj spid="_x0000_s1221" name="Equation" r:id="rId11" imgW="1485900" imgH="292100" progId="Equation.3">
                   <p:embed/>
                 </p:oleObj>
               </mc:Choice>
               <mc:Fallback>
-                <p:oleObj name="Equation" r:id="rId13" imgW="1485900" imgH="292100" progId="Equation.3">
+                <p:oleObj name="Equation" r:id="rId11" imgW="1485900" imgH="292100" progId="Equation.3">
                   <p:embed/>
                   <p:pic>
                     <p:nvPicPr>
@@ -3981,14 +3758,14 @@
                       <p:nvPr/>
                     </p:nvPicPr>
                     <p:blipFill>
-                      <a:blip r:embed="rId14"/>
+                      <a:blip r:embed="rId12"/>
                       <a:stretch>
                         <a:fillRect/>
                       </a:stretch>
                     </p:blipFill>
                     <p:spPr>
                       <a:xfrm>
-                        <a:off x="3554413" y="4192588"/>
+                        <a:off x="1604859" y="3239423"/>
                         <a:ext cx="1485900" cy="292100"/>
                       </a:xfrm>
                       <a:prstGeom prst="rect">
@@ -4002,11 +3779,220 @@
           </a:graphicData>
         </a:graphic>
       </p:graphicFrame>
+      <p:pic>
+        <p:nvPicPr>
+          <p:cNvPr id="13" name="Picture 12"/>
+          <p:cNvPicPr>
+            <a:picLocks noChangeAspect="1"/>
+          </p:cNvPicPr>
+          <p:nvPr/>
+        </p:nvPicPr>
+        <p:blipFill>
+          <a:blip r:embed="rId13"/>
+          <a:stretch>
+            <a:fillRect/>
+          </a:stretch>
+        </p:blipFill>
+        <p:spPr>
+          <a:xfrm>
+            <a:off x="3853731" y="2763096"/>
+            <a:ext cx="1702172" cy="1208412"/>
+          </a:xfrm>
+          <a:prstGeom prst="rect">
+            <a:avLst/>
+          </a:prstGeom>
+        </p:spPr>
+      </p:pic>
+      <p:cxnSp>
+        <p:nvCxnSpPr>
+          <p:cNvPr id="15" name="Straight Arrow Connector 14"/>
+          <p:cNvCxnSpPr>
+            <a:stCxn id="29" idx="5"/>
+          </p:cNvCxnSpPr>
+          <p:nvPr/>
+        </p:nvCxnSpPr>
+        <p:spPr>
+          <a:xfrm>
+            <a:off x="1064980" y="2698133"/>
+            <a:ext cx="410676" cy="246644"/>
+          </a:xfrm>
+          <a:prstGeom prst="straightConnector1">
+            <a:avLst/>
+          </a:prstGeom>
+          <a:ln>
+            <a:tailEnd type="triangle"/>
+          </a:ln>
+        </p:spPr>
+        <p:style>
+          <a:lnRef idx="3">
+            <a:schemeClr val="dk1"/>
+          </a:lnRef>
+          <a:fillRef idx="0">
+            <a:schemeClr val="dk1"/>
+          </a:fillRef>
+          <a:effectRef idx="2">
+            <a:schemeClr val="dk1"/>
+          </a:effectRef>
+          <a:fontRef idx="minor">
+            <a:schemeClr val="tx1"/>
+          </a:fontRef>
+        </p:style>
+      </p:cxnSp>
+      <p:cxnSp>
+        <p:nvCxnSpPr>
+          <p:cNvPr id="33" name="Straight Arrow Connector 32"/>
+          <p:cNvCxnSpPr>
+            <a:stCxn id="39" idx="7"/>
+          </p:cNvCxnSpPr>
+          <p:nvPr/>
+        </p:nvCxnSpPr>
+        <p:spPr>
+          <a:xfrm flipV="1">
+            <a:off x="1064980" y="3307132"/>
+            <a:ext cx="410675" cy="213198"/>
+          </a:xfrm>
+          <a:prstGeom prst="straightConnector1">
+            <a:avLst/>
+          </a:prstGeom>
+          <a:ln>
+            <a:tailEnd type="triangle"/>
+          </a:ln>
+        </p:spPr>
+        <p:style>
+          <a:lnRef idx="3">
+            <a:schemeClr val="dk1"/>
+          </a:lnRef>
+          <a:fillRef idx="0">
+            <a:schemeClr val="dk1"/>
+          </a:fillRef>
+          <a:effectRef idx="2">
+            <a:schemeClr val="dk1"/>
+          </a:effectRef>
+          <a:fontRef idx="minor">
+            <a:schemeClr val="tx1"/>
+          </a:fontRef>
+        </p:style>
+      </p:cxnSp>
+      <p:cxnSp>
+        <p:nvCxnSpPr>
+          <p:cNvPr id="36" name="Straight Arrow Connector 35"/>
+          <p:cNvCxnSpPr>
+            <a:stCxn id="18" idx="3"/>
+            <a:endCxn id="43" idx="1"/>
+          </p:cNvCxnSpPr>
+          <p:nvPr/>
+        </p:nvCxnSpPr>
+        <p:spPr>
+          <a:xfrm flipV="1">
+            <a:off x="3219963" y="3173835"/>
+            <a:ext cx="488909" cy="2"/>
+          </a:xfrm>
+          <a:prstGeom prst="straightConnector1">
+            <a:avLst/>
+          </a:prstGeom>
+          <a:ln>
+            <a:tailEnd type="triangle"/>
+          </a:ln>
+        </p:spPr>
+        <p:style>
+          <a:lnRef idx="3">
+            <a:schemeClr val="dk1"/>
+          </a:lnRef>
+          <a:fillRef idx="0">
+            <a:schemeClr val="dk1"/>
+          </a:fillRef>
+          <a:effectRef idx="2">
+            <a:schemeClr val="dk1"/>
+          </a:effectRef>
+          <a:fontRef idx="minor">
+            <a:schemeClr val="tx1"/>
+          </a:fontRef>
+        </p:style>
+      </p:cxnSp>
+      <p:cxnSp>
+        <p:nvCxnSpPr>
+          <p:cNvPr id="51" name="Straight Arrow Connector 50"/>
+          <p:cNvCxnSpPr>
+            <a:stCxn id="43" idx="3"/>
+            <a:endCxn id="45" idx="1"/>
+          </p:cNvCxnSpPr>
+          <p:nvPr/>
+        </p:nvCxnSpPr>
+        <p:spPr>
+          <a:xfrm>
+            <a:off x="5610115" y="3173835"/>
+            <a:ext cx="478574" cy="2"/>
+          </a:xfrm>
+          <a:prstGeom prst="straightConnector1">
+            <a:avLst/>
+          </a:prstGeom>
+          <a:ln>
+            <a:tailEnd type="triangle"/>
+          </a:ln>
+        </p:spPr>
+        <p:style>
+          <a:lnRef idx="3">
+            <a:schemeClr val="dk1"/>
+          </a:lnRef>
+          <a:fillRef idx="0">
+            <a:schemeClr val="dk1"/>
+          </a:fillRef>
+          <a:effectRef idx="2">
+            <a:schemeClr val="dk1"/>
+          </a:effectRef>
+          <a:fontRef idx="minor">
+            <a:schemeClr val="tx1"/>
+          </a:fontRef>
+        </p:style>
+      </p:cxnSp>
+      <p:cxnSp>
+        <p:nvCxnSpPr>
+          <p:cNvPr id="52" name="Straight Arrow Connector 51"/>
+          <p:cNvCxnSpPr>
+            <a:stCxn id="45" idx="3"/>
+            <a:endCxn id="46" idx="1"/>
+          </p:cNvCxnSpPr>
+          <p:nvPr/>
+        </p:nvCxnSpPr>
+        <p:spPr>
+          <a:xfrm flipV="1">
+            <a:off x="7610014" y="3173836"/>
+            <a:ext cx="466169" cy="1"/>
+          </a:xfrm>
+          <a:prstGeom prst="straightConnector1">
+            <a:avLst/>
+          </a:prstGeom>
+          <a:ln>
+            <a:tailEnd type="triangle"/>
+          </a:ln>
+        </p:spPr>
+        <p:style>
+          <a:lnRef idx="3">
+            <a:schemeClr val="dk1"/>
+          </a:lnRef>
+          <a:fillRef idx="0">
+            <a:schemeClr val="dk1"/>
+          </a:fillRef>
+          <a:effectRef idx="2">
+            <a:schemeClr val="dk1"/>
+          </a:effectRef>
+          <a:fontRef idx="minor">
+            <a:schemeClr val="tx1"/>
+          </a:fontRef>
+        </p:style>
+      </p:cxnSp>
     </p:spTree>
   </p:cSld>
   <p:clrMapOvr>
     <a:masterClrMapping/>
   </p:clrMapOvr>
+  <p:timing>
+    <p:tnLst>
+      <p:par>
+        <p:cTn id="1" dur="indefinite" restart="never" nodeType="tmRoot"/>
+      </p:par>
+    </p:tnLst>
+  </p:timing>
 </p:sld>
 </file>
 

</xml_diff>